<commit_message>
finish server file + update topic and introduction
</commit_message>
<xml_diff>
--- a/Reference/ROS/Introduction to ROS.pptx
+++ b/Reference/ROS/Introduction to ROS.pptx
@@ -301,7 +301,7 @@
           <a:p>
             <a:fld id="{1160EA64-D806-43AC-9DF2-F8C432F32B4C}" type="datetimeFigureOut">
               <a:rPr lang="en-US" dirty="0"/>
-              <a:t>6/20/2019</a:t>
+              <a:t>6/26/2019</a:t>
             </a:fld>
             <a:endParaRPr lang="en-US" dirty="0"/>
           </a:p>
@@ -467,7 +467,7 @@
           <a:p>
             <a:fld id="{E9F9C37B-1D36-470B-8223-D6C91242EC14}" type="datetimeFigureOut">
               <a:rPr lang="en-US" dirty="0"/>
-              <a:t>6/20/2019</a:t>
+              <a:t>6/26/2019</a:t>
             </a:fld>
             <a:endParaRPr lang="en-US" dirty="0"/>
           </a:p>
@@ -642,7 +642,7 @@
           <a:p>
             <a:fld id="{67C6F52A-A82B-47A2-A83A-8C4C91F2D59F}" type="datetimeFigureOut">
               <a:rPr lang="en-US" dirty="0"/>
-              <a:t>6/20/2019</a:t>
+              <a:t>6/26/2019</a:t>
             </a:fld>
             <a:endParaRPr lang="en-US" dirty="0"/>
           </a:p>
@@ -807,7 +807,7 @@
           <a:p>
             <a:fld id="{F070A7B3-6521-4DCA-87E5-044747A908C1}" type="datetimeFigureOut">
               <a:rPr lang="en-US" dirty="0"/>
-              <a:t>6/20/2019</a:t>
+              <a:t>6/26/2019</a:t>
             </a:fld>
             <a:endParaRPr lang="en-US" dirty="0"/>
           </a:p>
@@ -1071,7 +1071,7 @@
           <a:p>
             <a:fld id="{1160EA64-D806-43AC-9DF2-F8C432F32B4C}" type="datetimeFigureOut">
               <a:rPr lang="en-US" dirty="0"/>
-              <a:t>6/20/2019</a:t>
+              <a:t>6/26/2019</a:t>
             </a:fld>
             <a:endParaRPr lang="en-US" dirty="0"/>
           </a:p>
@@ -1299,7 +1299,7 @@
           <a:p>
             <a:fld id="{AB134690-1557-4C89-A502-4959FE7FAD70}" type="datetimeFigureOut">
               <a:rPr lang="en-US" dirty="0"/>
-              <a:t>6/20/2019</a:t>
+              <a:t>6/26/2019</a:t>
             </a:fld>
             <a:endParaRPr lang="en-US" dirty="0"/>
           </a:p>
@@ -1653,7 +1653,7 @@
           <a:p>
             <a:fld id="{4F7D4976-E339-4826-83B7-FBD03F55ECF8}" type="datetimeFigureOut">
               <a:rPr lang="en-US" dirty="0"/>
-              <a:t>6/20/2019</a:t>
+              <a:t>6/26/2019</a:t>
             </a:fld>
             <a:endParaRPr lang="en-US" dirty="0"/>
           </a:p>
@@ -1789,7 +1789,7 @@
           <a:p>
             <a:fld id="{E1037C31-9E7A-4F99-8774-A0E530DE1A42}" type="datetimeFigureOut">
               <a:rPr lang="en-US" dirty="0"/>
-              <a:t>6/20/2019</a:t>
+              <a:t>6/26/2019</a:t>
             </a:fld>
             <a:endParaRPr lang="en-US" dirty="0"/>
           </a:p>
@@ -1879,7 +1879,7 @@
           <a:p>
             <a:fld id="{C278504F-A551-4DE0-9316-4DCD1D8CC752}" type="datetimeFigureOut">
               <a:rPr lang="en-US" dirty="0"/>
-              <a:t>6/20/2019</a:t>
+              <a:t>6/26/2019</a:t>
             </a:fld>
             <a:endParaRPr lang="en-US" dirty="0"/>
           </a:p>
@@ -2231,7 +2231,7 @@
           <a:p>
             <a:fld id="{D1BE4249-C0D0-4B06-8692-E8BB871AF643}" type="datetimeFigureOut">
               <a:rPr lang="en-US" dirty="0"/>
-              <a:t>6/20/2019</a:t>
+              <a:t>6/26/2019</a:t>
             </a:fld>
             <a:endParaRPr lang="en-US" dirty="0"/>
           </a:p>
@@ -2583,7 +2583,7 @@
           <a:p>
             <a:fld id="{042B0DB6-F5C7-45FB-8CF3-31B45F9C2DAC}" type="datetimeFigureOut">
               <a:rPr lang="en-US" dirty="0"/>
-              <a:t>6/20/2019</a:t>
+              <a:t>6/26/2019</a:t>
             </a:fld>
             <a:endParaRPr lang="en-US" dirty="0"/>
           </a:p>
@@ -2819,7 +2819,7 @@
           <a:p>
             <a:fld id="{1160EA64-D806-43AC-9DF2-F8C432F32B4C}" type="datetimeFigureOut">
               <a:rPr lang="en-US" dirty="0"/>
-              <a:t>6/20/2019</a:t>
+              <a:t>6/26/2019</a:t>
             </a:fld>
             <a:endParaRPr lang="en-US" dirty="0"/>
           </a:p>
@@ -4835,15 +4835,8 @@
           <a:p>
             <a:r>
               <a:rPr lang="en-US" dirty="0"/>
-              <a:t>*Note: this part requires a full installation of ROS. Please install ROS and setup the workspace according to the </a:t>
-            </a:r>
-            <a:r>
-              <a:rPr lang="en-US" dirty="0">
-                <a:hlinkClick r:id="rId2" action="ppaction://hlinkfile"/>
-              </a:rPr>
-              <a:t>provided tutorial.</a:t>
-            </a:r>
-            <a:endParaRPr lang="en-US" dirty="0"/>
+              <a:t>*Note: this part requires a full installation of ROS. Please install ROS and setup the workspace according to the provided tutorial.</a:t>
+            </a:r>
           </a:p>
         </p:txBody>
       </p:sp>

</xml_diff>